<commit_message>
Typos on W12S1, finalized W12S2.
</commit_message>
<xml_diff>
--- a/W12/W12S1/W12S1.pptx
+++ b/W12/W12S1/W12S1.pptx
@@ -339,7 +339,7 @@
   <pc:docChgLst>
     <pc:chgData name="Matthieu De Mari" userId="dfb708c9-d8dc-439f-9a3b-c772bf4a311c" providerId="ADAL" clId="{CF552409-A127-4E9A-B700-AB4BACA41190}"/>
     <pc:docChg chg="undo custSel addSld delSld modSld sldOrd addSection modSection">
-      <pc:chgData name="Matthieu De Mari" userId="dfb708c9-d8dc-439f-9a3b-c772bf4a311c" providerId="ADAL" clId="{CF552409-A127-4E9A-B700-AB4BACA41190}" dt="2023-04-11T05:53:22.998" v="10884" actId="20577"/>
+      <pc:chgData name="Matthieu De Mari" userId="dfb708c9-d8dc-439f-9a3b-c772bf4a311c" providerId="ADAL" clId="{CF552409-A127-4E9A-B700-AB4BACA41190}" dt="2023-04-12T01:48:44.069" v="11063" actId="20577"/>
       <pc:docMkLst>
         <pc:docMk/>
       </pc:docMkLst>
@@ -1220,7 +1220,7 @@
         </pc:spChg>
       </pc:sldChg>
       <pc:sldChg chg="addSp modSp add mod ord">
-        <pc:chgData name="Matthieu De Mari" userId="dfb708c9-d8dc-439f-9a3b-c772bf4a311c" providerId="ADAL" clId="{CF552409-A127-4E9A-B700-AB4BACA41190}" dt="2023-04-10T07:31:17.345" v="6230" actId="20577"/>
+        <pc:chgData name="Matthieu De Mari" userId="dfb708c9-d8dc-439f-9a3b-c772bf4a311c" providerId="ADAL" clId="{CF552409-A127-4E9A-B700-AB4BACA41190}" dt="2023-04-11T10:40:37.287" v="10953" actId="20577"/>
         <pc:sldMkLst>
           <pc:docMk/>
           <pc:sldMk cId="2035935287" sldId="504"/>
@@ -1233,9 +1233,17 @@
             <ac:spMk id="3" creationId="{F1625517-E60B-C3D7-B47C-A2CABFF4E9D1}"/>
           </ac:spMkLst>
         </pc:spChg>
+        <pc:spChg chg="mod">
+          <ac:chgData name="Matthieu De Mari" userId="dfb708c9-d8dc-439f-9a3b-c772bf4a311c" providerId="ADAL" clId="{CF552409-A127-4E9A-B700-AB4BACA41190}" dt="2023-04-11T10:40:37.287" v="10953" actId="20577"/>
+          <ac:spMkLst>
+            <pc:docMk/>
+            <pc:sldMk cId="2035935287" sldId="504"/>
+            <ac:spMk id="10" creationId="{10DF647A-CA89-CFBF-D7B2-71B571D015EC}"/>
+          </ac:spMkLst>
+        </pc:spChg>
       </pc:sldChg>
       <pc:sldChg chg="addSp modSp add mod">
-        <pc:chgData name="Matthieu De Mari" userId="dfb708c9-d8dc-439f-9a3b-c772bf4a311c" providerId="ADAL" clId="{CF552409-A127-4E9A-B700-AB4BACA41190}" dt="2023-04-10T07:32:38.239" v="6410"/>
+        <pc:chgData name="Matthieu De Mari" userId="dfb708c9-d8dc-439f-9a3b-c772bf4a311c" providerId="ADAL" clId="{CF552409-A127-4E9A-B700-AB4BACA41190}" dt="2023-04-12T01:47:25.025" v="10962" actId="20577"/>
         <pc:sldMkLst>
           <pc:docMk/>
           <pc:sldMk cId="2891395927" sldId="505"/>
@@ -1265,7 +1273,7 @@
           </ac:spMkLst>
         </pc:spChg>
         <pc:spChg chg="mod">
-          <ac:chgData name="Matthieu De Mari" userId="dfb708c9-d8dc-439f-9a3b-c772bf4a311c" providerId="ADAL" clId="{CF552409-A127-4E9A-B700-AB4BACA41190}" dt="2023-04-10T07:32:38.239" v="6410"/>
+          <ac:chgData name="Matthieu De Mari" userId="dfb708c9-d8dc-439f-9a3b-c772bf4a311c" providerId="ADAL" clId="{CF552409-A127-4E9A-B700-AB4BACA41190}" dt="2023-04-12T01:47:25.025" v="10962" actId="20577"/>
           <ac:spMkLst>
             <pc:docMk/>
             <pc:sldMk cId="2891395927" sldId="505"/>
@@ -1274,7 +1282,7 @@
         </pc:spChg>
       </pc:sldChg>
       <pc:sldChg chg="addSp modSp add mod ord">
-        <pc:chgData name="Matthieu De Mari" userId="dfb708c9-d8dc-439f-9a3b-c772bf4a311c" providerId="ADAL" clId="{CF552409-A127-4E9A-B700-AB4BACA41190}" dt="2023-04-10T07:32:40.826" v="6411"/>
+        <pc:chgData name="Matthieu De Mari" userId="dfb708c9-d8dc-439f-9a3b-c772bf4a311c" providerId="ADAL" clId="{CF552409-A127-4E9A-B700-AB4BACA41190}" dt="2023-04-12T01:47:18.681" v="10956" actId="20577"/>
         <pc:sldMkLst>
           <pc:docMk/>
           <pc:sldMk cId="3337652519" sldId="506"/>
@@ -1304,7 +1312,7 @@
           </ac:spMkLst>
         </pc:spChg>
         <pc:spChg chg="mod">
-          <ac:chgData name="Matthieu De Mari" userId="dfb708c9-d8dc-439f-9a3b-c772bf4a311c" providerId="ADAL" clId="{CF552409-A127-4E9A-B700-AB4BACA41190}" dt="2023-04-10T07:32:40.826" v="6411"/>
+          <ac:chgData name="Matthieu De Mari" userId="dfb708c9-d8dc-439f-9a3b-c772bf4a311c" providerId="ADAL" clId="{CF552409-A127-4E9A-B700-AB4BACA41190}" dt="2023-04-12T01:47:18.681" v="10956" actId="20577"/>
           <ac:spMkLst>
             <pc:docMk/>
             <pc:sldMk cId="3337652519" sldId="506"/>
@@ -1313,7 +1321,7 @@
         </pc:spChg>
       </pc:sldChg>
       <pc:sldChg chg="addSp modSp add mod">
-        <pc:chgData name="Matthieu De Mari" userId="dfb708c9-d8dc-439f-9a3b-c772bf4a311c" providerId="ADAL" clId="{CF552409-A127-4E9A-B700-AB4BACA41190}" dt="2023-04-10T07:33:44.932" v="6461" actId="27636"/>
+        <pc:chgData name="Matthieu De Mari" userId="dfb708c9-d8dc-439f-9a3b-c772bf4a311c" providerId="ADAL" clId="{CF552409-A127-4E9A-B700-AB4BACA41190}" dt="2023-04-12T01:47:32.388" v="10971" actId="20577"/>
         <pc:sldMkLst>
           <pc:docMk/>
           <pc:sldMk cId="2482738323" sldId="507"/>
@@ -1351,7 +1359,7 @@
           </ac:spMkLst>
         </pc:spChg>
         <pc:spChg chg="mod">
-          <ac:chgData name="Matthieu De Mari" userId="dfb708c9-d8dc-439f-9a3b-c772bf4a311c" providerId="ADAL" clId="{CF552409-A127-4E9A-B700-AB4BACA41190}" dt="2023-04-10T07:33:44.932" v="6461" actId="27636"/>
+          <ac:chgData name="Matthieu De Mari" userId="dfb708c9-d8dc-439f-9a3b-c772bf4a311c" providerId="ADAL" clId="{CF552409-A127-4E9A-B700-AB4BACA41190}" dt="2023-04-12T01:47:32.388" v="10971" actId="20577"/>
           <ac:spMkLst>
             <pc:docMk/>
             <pc:sldMk cId="2482738323" sldId="507"/>
@@ -1360,7 +1368,7 @@
         </pc:spChg>
       </pc:sldChg>
       <pc:sldChg chg="addSp modSp add mod">
-        <pc:chgData name="Matthieu De Mari" userId="dfb708c9-d8dc-439f-9a3b-c772bf4a311c" providerId="ADAL" clId="{CF552409-A127-4E9A-B700-AB4BACA41190}" dt="2023-04-10T07:34:53.348" v="6557" actId="20577"/>
+        <pc:chgData name="Matthieu De Mari" userId="dfb708c9-d8dc-439f-9a3b-c772bf4a311c" providerId="ADAL" clId="{CF552409-A127-4E9A-B700-AB4BACA41190}" dt="2023-04-12T01:47:55.963" v="10998" actId="27636"/>
         <pc:sldMkLst>
           <pc:docMk/>
           <pc:sldMk cId="436881398" sldId="508"/>
@@ -1374,7 +1382,7 @@
           </ac:spMkLst>
         </pc:spChg>
         <pc:spChg chg="mod">
-          <ac:chgData name="Matthieu De Mari" userId="dfb708c9-d8dc-439f-9a3b-c772bf4a311c" providerId="ADAL" clId="{CF552409-A127-4E9A-B700-AB4BACA41190}" dt="2023-04-10T07:34:23.967" v="6523" actId="27636"/>
+          <ac:chgData name="Matthieu De Mari" userId="dfb708c9-d8dc-439f-9a3b-c772bf4a311c" providerId="ADAL" clId="{CF552409-A127-4E9A-B700-AB4BACA41190}" dt="2023-04-12T01:47:55.960" v="10997" actId="27636"/>
           <ac:spMkLst>
             <pc:docMk/>
             <pc:sldMk cId="436881398" sldId="508"/>
@@ -1390,7 +1398,7 @@
           </ac:spMkLst>
         </pc:spChg>
         <pc:spChg chg="mod">
-          <ac:chgData name="Matthieu De Mari" userId="dfb708c9-d8dc-439f-9a3b-c772bf4a311c" providerId="ADAL" clId="{CF552409-A127-4E9A-B700-AB4BACA41190}" dt="2023-04-10T07:34:53.348" v="6557" actId="20577"/>
+          <ac:chgData name="Matthieu De Mari" userId="dfb708c9-d8dc-439f-9a3b-c772bf4a311c" providerId="ADAL" clId="{CF552409-A127-4E9A-B700-AB4BACA41190}" dt="2023-04-12T01:47:55.963" v="10998" actId="27636"/>
           <ac:spMkLst>
             <pc:docMk/>
             <pc:sldMk cId="436881398" sldId="508"/>
@@ -1406,7 +1414,7 @@
         </pc:sldMkLst>
       </pc:sldChg>
       <pc:sldChg chg="modSp add mod">
-        <pc:chgData name="Matthieu De Mari" userId="dfb708c9-d8dc-439f-9a3b-c772bf4a311c" providerId="ADAL" clId="{CF552409-A127-4E9A-B700-AB4BACA41190}" dt="2023-04-10T07:35:12.679" v="6583" actId="20577"/>
+        <pc:chgData name="Matthieu De Mari" userId="dfb708c9-d8dc-439f-9a3b-c772bf4a311c" providerId="ADAL" clId="{CF552409-A127-4E9A-B700-AB4BACA41190}" dt="2023-04-12T01:48:16.013" v="11023" actId="20577"/>
         <pc:sldMkLst>
           <pc:docMk/>
           <pc:sldMk cId="270939805" sldId="510"/>
@@ -1420,6 +1428,14 @@
           </ac:spMkLst>
         </pc:spChg>
         <pc:spChg chg="mod">
+          <ac:chgData name="Matthieu De Mari" userId="dfb708c9-d8dc-439f-9a3b-c772bf4a311c" providerId="ADAL" clId="{CF552409-A127-4E9A-B700-AB4BACA41190}" dt="2023-04-12T01:48:09.927" v="11013" actId="27636"/>
+          <ac:spMkLst>
+            <pc:docMk/>
+            <pc:sldMk cId="270939805" sldId="510"/>
+            <ac:spMk id="5" creationId="{B9BCF7C3-6DDD-A291-7A3C-FEEBFA4BDF34}"/>
+          </ac:spMkLst>
+        </pc:spChg>
+        <pc:spChg chg="mod">
           <ac:chgData name="Matthieu De Mari" userId="dfb708c9-d8dc-439f-9a3b-c772bf4a311c" providerId="ADAL" clId="{CF552409-A127-4E9A-B700-AB4BACA41190}" dt="2023-04-10T07:35:07.969" v="6582" actId="1036"/>
           <ac:spMkLst>
             <pc:docMk/>
@@ -1427,9 +1443,17 @@
             <ac:spMk id="9" creationId="{6C41EA8B-2357-6CEA-370B-1BC5870415F0}"/>
           </ac:spMkLst>
         </pc:spChg>
+        <pc:spChg chg="mod">
+          <ac:chgData name="Matthieu De Mari" userId="dfb708c9-d8dc-439f-9a3b-c772bf4a311c" providerId="ADAL" clId="{CF552409-A127-4E9A-B700-AB4BACA41190}" dt="2023-04-12T01:48:16.013" v="11023" actId="20577"/>
+          <ac:spMkLst>
+            <pc:docMk/>
+            <pc:sldMk cId="270939805" sldId="510"/>
+            <ac:spMk id="10" creationId="{10DF647A-CA89-CFBF-D7B2-71B571D015EC}"/>
+          </ac:spMkLst>
+        </pc:spChg>
       </pc:sldChg>
       <pc:sldChg chg="addSp modSp add mod">
-        <pc:chgData name="Matthieu De Mari" userId="dfb708c9-d8dc-439f-9a3b-c772bf4a311c" providerId="ADAL" clId="{CF552409-A127-4E9A-B700-AB4BACA41190}" dt="2023-04-10T07:36:40.851" v="6739"/>
+        <pc:chgData name="Matthieu De Mari" userId="dfb708c9-d8dc-439f-9a3b-c772bf4a311c" providerId="ADAL" clId="{CF552409-A127-4E9A-B700-AB4BACA41190}" dt="2023-04-12T01:48:29.040" v="11043" actId="20577"/>
         <pc:sldMkLst>
           <pc:docMk/>
           <pc:sldMk cId="798158365" sldId="511"/>
@@ -1458,9 +1482,17 @@
             <ac:spMk id="9" creationId="{6C41EA8B-2357-6CEA-370B-1BC5870415F0}"/>
           </ac:spMkLst>
         </pc:spChg>
+        <pc:spChg chg="mod">
+          <ac:chgData name="Matthieu De Mari" userId="dfb708c9-d8dc-439f-9a3b-c772bf4a311c" providerId="ADAL" clId="{CF552409-A127-4E9A-B700-AB4BACA41190}" dt="2023-04-12T01:48:29.040" v="11043" actId="20577"/>
+          <ac:spMkLst>
+            <pc:docMk/>
+            <pc:sldMk cId="798158365" sldId="511"/>
+            <ac:spMk id="10" creationId="{10DF647A-CA89-CFBF-D7B2-71B571D015EC}"/>
+          </ac:spMkLst>
+        </pc:spChg>
       </pc:sldChg>
       <pc:sldChg chg="addSp modSp add mod">
-        <pc:chgData name="Matthieu De Mari" userId="dfb708c9-d8dc-439f-9a3b-c772bf4a311c" providerId="ADAL" clId="{CF552409-A127-4E9A-B700-AB4BACA41190}" dt="2023-04-10T07:36:35.072" v="6738" actId="1076"/>
+        <pc:chgData name="Matthieu De Mari" userId="dfb708c9-d8dc-439f-9a3b-c772bf4a311c" providerId="ADAL" clId="{CF552409-A127-4E9A-B700-AB4BACA41190}" dt="2023-04-12T01:48:35.474" v="11053" actId="20577"/>
         <pc:sldMkLst>
           <pc:docMk/>
           <pc:sldMk cId="1753366962" sldId="512"/>
@@ -1482,7 +1514,7 @@
           </ac:spMkLst>
         </pc:spChg>
         <pc:spChg chg="mod">
-          <ac:chgData name="Matthieu De Mari" userId="dfb708c9-d8dc-439f-9a3b-c772bf4a311c" providerId="ADAL" clId="{CF552409-A127-4E9A-B700-AB4BACA41190}" dt="2023-04-10T07:36:20.803" v="6735" actId="20577"/>
+          <ac:chgData name="Matthieu De Mari" userId="dfb708c9-d8dc-439f-9a3b-c772bf4a311c" providerId="ADAL" clId="{CF552409-A127-4E9A-B700-AB4BACA41190}" dt="2023-04-12T01:48:35.474" v="11053" actId="20577"/>
           <ac:spMkLst>
             <pc:docMk/>
             <pc:sldMk cId="1753366962" sldId="512"/>
@@ -1514,7 +1546,7 @@
         </pc:spChg>
       </pc:sldChg>
       <pc:sldChg chg="modSp add mod">
-        <pc:chgData name="Matthieu De Mari" userId="dfb708c9-d8dc-439f-9a3b-c772bf4a311c" providerId="ADAL" clId="{CF552409-A127-4E9A-B700-AB4BACA41190}" dt="2023-04-10T07:37:29.366" v="6868" actId="20577"/>
+        <pc:chgData name="Matthieu De Mari" userId="dfb708c9-d8dc-439f-9a3b-c772bf4a311c" providerId="ADAL" clId="{CF552409-A127-4E9A-B700-AB4BACA41190}" dt="2023-04-12T01:48:44.069" v="11063" actId="20577"/>
         <pc:sldMkLst>
           <pc:docMk/>
           <pc:sldMk cId="4199409087" sldId="514"/>
@@ -1533,6 +1565,14 @@
             <pc:docMk/>
             <pc:sldMk cId="4199409087" sldId="514"/>
             <ac:spMk id="9" creationId="{6C41EA8B-2357-6CEA-370B-1BC5870415F0}"/>
+          </ac:spMkLst>
+        </pc:spChg>
+        <pc:spChg chg="mod">
+          <ac:chgData name="Matthieu De Mari" userId="dfb708c9-d8dc-439f-9a3b-c772bf4a311c" providerId="ADAL" clId="{CF552409-A127-4E9A-B700-AB4BACA41190}" dt="2023-04-12T01:48:44.069" v="11063" actId="20577"/>
+          <ac:spMkLst>
+            <pc:docMk/>
+            <pc:sldMk cId="4199409087" sldId="514"/>
+            <ac:spMk id="10" creationId="{10DF647A-CA89-CFBF-D7B2-71B571D015EC}"/>
           </ac:spMkLst>
         </pc:spChg>
       </pc:sldChg>
@@ -16326,7 +16366,7 @@
           <a:p>
             <a:fld id="{98CFC6A4-B085-437B-8084-693BEB2A32DE}" type="datetimeFigureOut">
               <a:rPr lang="en-SG" smtClean="0"/>
-              <a:t>11/4/2023</a:t>
+              <a:t>12/4/2023</a:t>
             </a:fld>
             <a:endParaRPr lang="en-SG"/>
           </a:p>
@@ -16743,7 +16783,7 @@
           <a:p>
             <a:fld id="{AB35F6B0-D468-4997-9CE3-CF2A1AE5E3F9}" type="datetimeFigureOut">
               <a:rPr lang="en-SG" smtClean="0"/>
-              <a:t>11/4/2023</a:t>
+              <a:t>12/4/2023</a:t>
             </a:fld>
             <a:endParaRPr lang="en-SG"/>
           </a:p>
@@ -16943,7 +16983,7 @@
           <a:p>
             <a:fld id="{AB35F6B0-D468-4997-9CE3-CF2A1AE5E3F9}" type="datetimeFigureOut">
               <a:rPr lang="en-SG" smtClean="0"/>
-              <a:t>11/4/2023</a:t>
+              <a:t>12/4/2023</a:t>
             </a:fld>
             <a:endParaRPr lang="en-SG"/>
           </a:p>
@@ -17153,7 +17193,7 @@
           <a:p>
             <a:fld id="{AB35F6B0-D468-4997-9CE3-CF2A1AE5E3F9}" type="datetimeFigureOut">
               <a:rPr lang="en-SG" smtClean="0"/>
-              <a:t>11/4/2023</a:t>
+              <a:t>12/4/2023</a:t>
             </a:fld>
             <a:endParaRPr lang="en-SG"/>
           </a:p>
@@ -17353,7 +17393,7 @@
           <a:p>
             <a:fld id="{AB35F6B0-D468-4997-9CE3-CF2A1AE5E3F9}" type="datetimeFigureOut">
               <a:rPr lang="en-SG" smtClean="0"/>
-              <a:t>11/4/2023</a:t>
+              <a:t>12/4/2023</a:t>
             </a:fld>
             <a:endParaRPr lang="en-SG"/>
           </a:p>
@@ -17629,7 +17669,7 @@
           <a:p>
             <a:fld id="{AB35F6B0-D468-4997-9CE3-CF2A1AE5E3F9}" type="datetimeFigureOut">
               <a:rPr lang="en-SG" smtClean="0"/>
-              <a:t>11/4/2023</a:t>
+              <a:t>12/4/2023</a:t>
             </a:fld>
             <a:endParaRPr lang="en-SG"/>
           </a:p>
@@ -17897,7 +17937,7 @@
           <a:p>
             <a:fld id="{AB35F6B0-D468-4997-9CE3-CF2A1AE5E3F9}" type="datetimeFigureOut">
               <a:rPr lang="en-SG" smtClean="0"/>
-              <a:t>11/4/2023</a:t>
+              <a:t>12/4/2023</a:t>
             </a:fld>
             <a:endParaRPr lang="en-SG"/>
           </a:p>
@@ -18312,7 +18352,7 @@
           <a:p>
             <a:fld id="{AB35F6B0-D468-4997-9CE3-CF2A1AE5E3F9}" type="datetimeFigureOut">
               <a:rPr lang="en-SG" smtClean="0"/>
-              <a:t>11/4/2023</a:t>
+              <a:t>12/4/2023</a:t>
             </a:fld>
             <a:endParaRPr lang="en-SG"/>
           </a:p>
@@ -18454,7 +18494,7 @@
           <a:p>
             <a:fld id="{AB35F6B0-D468-4997-9CE3-CF2A1AE5E3F9}" type="datetimeFigureOut">
               <a:rPr lang="en-SG" smtClean="0"/>
-              <a:t>11/4/2023</a:t>
+              <a:t>12/4/2023</a:t>
             </a:fld>
             <a:endParaRPr lang="en-SG"/>
           </a:p>
@@ -18567,7 +18607,7 @@
           <a:p>
             <a:fld id="{AB35F6B0-D468-4997-9CE3-CF2A1AE5E3F9}" type="datetimeFigureOut">
               <a:rPr lang="en-SG" smtClean="0"/>
-              <a:t>11/4/2023</a:t>
+              <a:t>12/4/2023</a:t>
             </a:fld>
             <a:endParaRPr lang="en-SG"/>
           </a:p>
@@ -18880,7 +18920,7 @@
           <a:p>
             <a:fld id="{AB35F6B0-D468-4997-9CE3-CF2A1AE5E3F9}" type="datetimeFigureOut">
               <a:rPr lang="en-SG" smtClean="0"/>
-              <a:t>11/4/2023</a:t>
+              <a:t>12/4/2023</a:t>
             </a:fld>
             <a:endParaRPr lang="en-SG"/>
           </a:p>
@@ -19169,7 +19209,7 @@
           <a:p>
             <a:fld id="{AB35F6B0-D468-4997-9CE3-CF2A1AE5E3F9}" type="datetimeFigureOut">
               <a:rPr lang="en-SG" smtClean="0"/>
-              <a:t>11/4/2023</a:t>
+              <a:t>12/4/2023</a:t>
             </a:fld>
             <a:endParaRPr lang="en-SG"/>
           </a:p>
@@ -19412,7 +19452,7 @@
           <a:p>
             <a:fld id="{AB35F6B0-D468-4997-9CE3-CF2A1AE5E3F9}" type="datetimeFigureOut">
               <a:rPr lang="en-SG" smtClean="0"/>
-              <a:t>11/4/2023</a:t>
+              <a:t>12/4/2023</a:t>
             </a:fld>
             <a:endParaRPr lang="en-SG"/>
           </a:p>
@@ -23479,6 +23519,13 @@
               <a:rPr lang="en-SG" dirty="0"/>
               <a:t> (function)</a:t>
             </a:r>
+            <a:br>
+              <a:rPr lang="en-SG" dirty="0"/>
+            </a:br>
+            <a:r>
+              <a:rPr lang="en-SG" dirty="0"/>
+              <a:t>(could also add information about parameters types and return types)</a:t>
+            </a:r>
           </a:p>
         </p:txBody>
       </p:sp>
@@ -24152,7 +24199,7 @@
             </a:pPr>
             <a:r>
               <a:rPr lang="en-SG" dirty="0"/>
-              <a:t>      ├ a (int)</a:t>
+              <a:t>      ├ a (int, 3)</a:t>
             </a:r>
           </a:p>
         </p:txBody>
@@ -24460,7 +24507,7 @@
             </a:pPr>
             <a:r>
               <a:rPr lang="en-SG" dirty="0"/>
-              <a:t>      ├ a (int)</a:t>
+              <a:t>      ├ a (int, 3)</a:t>
             </a:r>
           </a:p>
           <a:p>
@@ -24469,7 +24516,7 @@
             </a:pPr>
             <a:r>
               <a:rPr lang="en-SG" dirty="0"/>
-              <a:t>      ├ b (int)</a:t>
+              <a:t>      ├ b (int, 4)</a:t>
             </a:r>
           </a:p>
         </p:txBody>
@@ -24777,7 +24824,7 @@
             </a:pPr>
             <a:r>
               <a:rPr lang="en-SG" dirty="0"/>
-              <a:t>      ├ a (int)</a:t>
+              <a:t>      ├ a (int, 3)</a:t>
             </a:r>
           </a:p>
           <a:p>
@@ -24786,7 +24833,7 @@
             </a:pPr>
             <a:r>
               <a:rPr lang="en-SG" dirty="0"/>
-              <a:t>      ├ b (int)</a:t>
+              <a:t>      ├ b (int, 4)</a:t>
             </a:r>
           </a:p>
           <a:p>
@@ -24795,7 +24842,7 @@
             </a:pPr>
             <a:r>
               <a:rPr lang="en-SG" dirty="0"/>
-              <a:t>      └─ sum (int)</a:t>
+              <a:t>      └─ sum (int, ?)</a:t>
             </a:r>
           </a:p>
           <a:p>
@@ -25086,7 +25133,7 @@
         <p:spPr/>
         <p:txBody>
           <a:bodyPr>
-            <a:normAutofit lnSpcReduction="10000"/>
+            <a:normAutofit/>
           </a:bodyPr>
           <a:lstStyle/>
           <a:p>
@@ -25134,7 +25181,7 @@
         </p:spPr>
         <p:txBody>
           <a:bodyPr>
-            <a:normAutofit lnSpcReduction="10000"/>
+            <a:normAutofit/>
           </a:bodyPr>
           <a:lstStyle/>
           <a:p>
@@ -25186,7 +25233,7 @@
             </a:pPr>
             <a:r>
               <a:rPr lang="en-SG" dirty="0"/>
-              <a:t>      ├ a (int)</a:t>
+              <a:t>      ├ a (int, 3)</a:t>
             </a:r>
           </a:p>
           <a:p>
@@ -25195,7 +25242,7 @@
             </a:pPr>
             <a:r>
               <a:rPr lang="en-SG" dirty="0"/>
-              <a:t>      ├ b (int)</a:t>
+              <a:t>      ├ b (int, 4)</a:t>
             </a:r>
           </a:p>
           <a:p>
@@ -25204,7 +25251,7 @@
             </a:pPr>
             <a:r>
               <a:rPr lang="en-SG" dirty="0"/>
-              <a:t>      └─ sum (int)</a:t>
+              <a:t>      └─ sum (int, ?)</a:t>
             </a:r>
           </a:p>
           <a:p>
@@ -25238,7 +25285,7 @@
             </a:pPr>
             <a:r>
               <a:rPr lang="en-SG" dirty="0"/>
-              <a:t>                     ├ x (int, parameter)</a:t>
+              <a:t>                     ├ x (int, parameter, 3)</a:t>
             </a:r>
           </a:p>
           <a:p>
@@ -25247,17 +25294,14 @@
             </a:pPr>
             <a:r>
               <a:rPr lang="en-SG" dirty="0"/>
-              <a:t>                     ├ y (int, parameter)</a:t>
+              <a:t>                     ├ y (int, parameter, 4)</a:t>
             </a:r>
           </a:p>
           <a:p>
             <a:pPr marL="0" indent="0">
               <a:buNone/>
             </a:pPr>
-            <a:r>
-              <a:rPr lang="en-SG" dirty="0"/>
-              <a:t>      	          └─ result (int)</a:t>
-            </a:r>
+            <a:endParaRPr lang="en-SG" dirty="0"/>
           </a:p>
         </p:txBody>
       </p:sp>
@@ -25725,7 +25769,7 @@
             </a:pPr>
             <a:r>
               <a:rPr lang="en-SG" dirty="0"/>
-              <a:t>      ├ a (int)</a:t>
+              <a:t>      ├ a (int, 3)</a:t>
             </a:r>
           </a:p>
           <a:p>
@@ -25734,7 +25778,7 @@
             </a:pPr>
             <a:r>
               <a:rPr lang="en-SG" dirty="0"/>
-              <a:t>      ├ b (int)</a:t>
+              <a:t>      ├ b (int, 4)</a:t>
             </a:r>
           </a:p>
           <a:p>
@@ -25743,7 +25787,7 @@
             </a:pPr>
             <a:r>
               <a:rPr lang="en-SG" dirty="0"/>
-              <a:t>      └─ sum (int)</a:t>
+              <a:t>      └─ sum (int, ?)</a:t>
             </a:r>
           </a:p>
           <a:p>
@@ -25777,7 +25821,7 @@
             </a:pPr>
             <a:r>
               <a:rPr lang="en-SG" dirty="0"/>
-              <a:t>                     ├ x (int, parameter)</a:t>
+              <a:t>                     ├ x (int, parameter, 3)</a:t>
             </a:r>
           </a:p>
           <a:p>
@@ -25786,7 +25830,7 @@
             </a:pPr>
             <a:r>
               <a:rPr lang="en-SG" dirty="0"/>
-              <a:t>                     ├ y (int, parameter)</a:t>
+              <a:t>                     ├ y (int, parameter, 4)</a:t>
             </a:r>
           </a:p>
           <a:p>
@@ -25795,7 +25839,7 @@
             </a:pPr>
             <a:r>
               <a:rPr lang="en-SG" dirty="0"/>
-              <a:t>      	          └─ result (int)</a:t>
+              <a:t>      	          └─ result (int, 15)</a:t>
             </a:r>
           </a:p>
         </p:txBody>
@@ -26103,7 +26147,7 @@
             </a:pPr>
             <a:r>
               <a:rPr lang="en-SG" dirty="0"/>
-              <a:t>      ├ a (int)</a:t>
+              <a:t>      ├ a (int, 3)</a:t>
             </a:r>
           </a:p>
           <a:p>
@@ -26112,7 +26156,7 @@
             </a:pPr>
             <a:r>
               <a:rPr lang="en-SG" dirty="0"/>
-              <a:t>      ├ b (int)</a:t>
+              <a:t>      ├ b (int, 4)</a:t>
             </a:r>
           </a:p>
           <a:p>
@@ -26121,7 +26165,7 @@
             </a:pPr>
             <a:r>
               <a:rPr lang="en-SG" dirty="0"/>
-              <a:t>      └─ sum (int)</a:t>
+              <a:t>      └─ sum (int, 15)</a:t>
             </a:r>
           </a:p>
           <a:p>
@@ -26155,7 +26199,7 @@
             </a:pPr>
             <a:r>
               <a:rPr lang="en-SG" dirty="0"/>
-              <a:t>                     ├ x (int, parameter)</a:t>
+              <a:t>                     ├ x (int, parameter, 3)</a:t>
             </a:r>
           </a:p>
           <a:p>
@@ -26164,7 +26208,7 @@
             </a:pPr>
             <a:r>
               <a:rPr lang="en-SG" dirty="0"/>
-              <a:t>                     ├ y (int, parameter)</a:t>
+              <a:t>                     ├ y (int, parameter, 4)</a:t>
             </a:r>
           </a:p>
           <a:p>
@@ -26173,7 +26217,7 @@
             </a:pPr>
             <a:r>
               <a:rPr lang="en-SG" dirty="0"/>
-              <a:t>      	          └─ result (int)</a:t>
+              <a:t>      	          └─ result (int, 15)</a:t>
             </a:r>
           </a:p>
         </p:txBody>
@@ -26527,7 +26571,7 @@
             </a:pPr>
             <a:r>
               <a:rPr lang="en-SG" dirty="0"/>
-              <a:t>      ├ a (int)</a:t>
+              <a:t>      ├ a (int, 3)</a:t>
             </a:r>
           </a:p>
           <a:p>
@@ -26536,7 +26580,7 @@
             </a:pPr>
             <a:r>
               <a:rPr lang="en-SG" dirty="0"/>
-              <a:t>      ├ b (int)</a:t>
+              <a:t>      ├ b (int, 4)</a:t>
             </a:r>
           </a:p>
           <a:p>
@@ -26545,7 +26589,7 @@
             </a:pPr>
             <a:r>
               <a:rPr lang="en-SG" dirty="0"/>
-              <a:t>      └─ sum (int)</a:t>
+              <a:t>      └─ sum (int, 15)</a:t>
             </a:r>
           </a:p>
         </p:txBody>
@@ -27225,7 +27269,7 @@
             </a:pPr>
             <a:r>
               <a:rPr lang="en-SG" dirty="0"/>
-              <a:t>      ├ a (int)</a:t>
+              <a:t>      ├ a (int, 3)</a:t>
             </a:r>
           </a:p>
           <a:p>
@@ -27234,7 +27278,7 @@
             </a:pPr>
             <a:r>
               <a:rPr lang="en-SG" dirty="0"/>
-              <a:t>      ├ b (int)</a:t>
+              <a:t>      ├ b (int, 4)</a:t>
             </a:r>
           </a:p>
           <a:p>
@@ -27243,7 +27287,7 @@
             </a:pPr>
             <a:r>
               <a:rPr lang="en-SG" dirty="0"/>
-              <a:t>      └─ sum (int)</a:t>
+              <a:t>      └─ sum (int, 15)</a:t>
             </a:r>
           </a:p>
         </p:txBody>

</xml_diff>

<commit_message>
Finalized W13S3 End lecture.
</commit_message>
<xml_diff>
--- a/W12/W12S1/W12S1.pptx
+++ b/W12/W12S1/W12S1.pptx
@@ -339,7 +339,7 @@
   <pc:docChgLst>
     <pc:chgData name="Matthieu De Mari" userId="dfb708c9-d8dc-439f-9a3b-c772bf4a311c" providerId="ADAL" clId="{CF552409-A127-4E9A-B700-AB4BACA41190}"/>
     <pc:docChg chg="undo custSel addSld delSld modSld sldOrd addSection modSection">
-      <pc:chgData name="Matthieu De Mari" userId="dfb708c9-d8dc-439f-9a3b-c772bf4a311c" providerId="ADAL" clId="{CF552409-A127-4E9A-B700-AB4BACA41190}" dt="2023-04-12T01:48:44.069" v="11063" actId="20577"/>
+      <pc:chgData name="Matthieu De Mari" userId="dfb708c9-d8dc-439f-9a3b-c772bf4a311c" providerId="ADAL" clId="{CF552409-A127-4E9A-B700-AB4BACA41190}" dt="2023-04-20T06:10:17.782" v="11064" actId="114"/>
       <pc:docMkLst>
         <pc:docMk/>
       </pc:docMkLst>
@@ -605,12 +605,20 @@
           </ac:picMkLst>
         </pc:picChg>
       </pc:sldChg>
-      <pc:sldChg chg="add">
-        <pc:chgData name="Matthieu De Mari" userId="dfb708c9-d8dc-439f-9a3b-c772bf4a311c" providerId="ADAL" clId="{CF552409-A127-4E9A-B700-AB4BACA41190}" dt="2023-04-10T06:36:20.186" v="2735"/>
+      <pc:sldChg chg="modSp add mod">
+        <pc:chgData name="Matthieu De Mari" userId="dfb708c9-d8dc-439f-9a3b-c772bf4a311c" providerId="ADAL" clId="{CF552409-A127-4E9A-B700-AB4BACA41190}" dt="2023-04-20T06:10:17.782" v="11064" actId="114"/>
         <pc:sldMkLst>
           <pc:docMk/>
           <pc:sldMk cId="77252181" sldId="486"/>
         </pc:sldMkLst>
+        <pc:spChg chg="mod">
+          <ac:chgData name="Matthieu De Mari" userId="dfb708c9-d8dc-439f-9a3b-c772bf4a311c" providerId="ADAL" clId="{CF552409-A127-4E9A-B700-AB4BACA41190}" dt="2023-04-20T06:10:17.782" v="11064" actId="114"/>
+          <ac:spMkLst>
+            <pc:docMk/>
+            <pc:sldMk cId="77252181" sldId="486"/>
+            <ac:spMk id="11" creationId="{50451FBF-ED90-F36E-E825-3B144BFD8D70}"/>
+          </ac:spMkLst>
+        </pc:spChg>
       </pc:sldChg>
       <pc:sldChg chg="modSp new del mod">
         <pc:chgData name="Matthieu De Mari" userId="dfb708c9-d8dc-439f-9a3b-c772bf4a311c" providerId="ADAL" clId="{CF552409-A127-4E9A-B700-AB4BACA41190}" dt="2023-04-10T06:43:55.266" v="3185" actId="47"/>
@@ -16366,7 +16374,7 @@
           <a:p>
             <a:fld id="{98CFC6A4-B085-437B-8084-693BEB2A32DE}" type="datetimeFigureOut">
               <a:rPr lang="en-SG" smtClean="0"/>
-              <a:t>12/4/2023</a:t>
+              <a:t>20/4/2023</a:t>
             </a:fld>
             <a:endParaRPr lang="en-SG"/>
           </a:p>
@@ -16783,7 +16791,7 @@
           <a:p>
             <a:fld id="{AB35F6B0-D468-4997-9CE3-CF2A1AE5E3F9}" type="datetimeFigureOut">
               <a:rPr lang="en-SG" smtClean="0"/>
-              <a:t>12/4/2023</a:t>
+              <a:t>20/4/2023</a:t>
             </a:fld>
             <a:endParaRPr lang="en-SG"/>
           </a:p>
@@ -16983,7 +16991,7 @@
           <a:p>
             <a:fld id="{AB35F6B0-D468-4997-9CE3-CF2A1AE5E3F9}" type="datetimeFigureOut">
               <a:rPr lang="en-SG" smtClean="0"/>
-              <a:t>12/4/2023</a:t>
+              <a:t>20/4/2023</a:t>
             </a:fld>
             <a:endParaRPr lang="en-SG"/>
           </a:p>
@@ -17193,7 +17201,7 @@
           <a:p>
             <a:fld id="{AB35F6B0-D468-4997-9CE3-CF2A1AE5E3F9}" type="datetimeFigureOut">
               <a:rPr lang="en-SG" smtClean="0"/>
-              <a:t>12/4/2023</a:t>
+              <a:t>20/4/2023</a:t>
             </a:fld>
             <a:endParaRPr lang="en-SG"/>
           </a:p>
@@ -17393,7 +17401,7 @@
           <a:p>
             <a:fld id="{AB35F6B0-D468-4997-9CE3-CF2A1AE5E3F9}" type="datetimeFigureOut">
               <a:rPr lang="en-SG" smtClean="0"/>
-              <a:t>12/4/2023</a:t>
+              <a:t>20/4/2023</a:t>
             </a:fld>
             <a:endParaRPr lang="en-SG"/>
           </a:p>
@@ -17669,7 +17677,7 @@
           <a:p>
             <a:fld id="{AB35F6B0-D468-4997-9CE3-CF2A1AE5E3F9}" type="datetimeFigureOut">
               <a:rPr lang="en-SG" smtClean="0"/>
-              <a:t>12/4/2023</a:t>
+              <a:t>20/4/2023</a:t>
             </a:fld>
             <a:endParaRPr lang="en-SG"/>
           </a:p>
@@ -17937,7 +17945,7 @@
           <a:p>
             <a:fld id="{AB35F6B0-D468-4997-9CE3-CF2A1AE5E3F9}" type="datetimeFigureOut">
               <a:rPr lang="en-SG" smtClean="0"/>
-              <a:t>12/4/2023</a:t>
+              <a:t>20/4/2023</a:t>
             </a:fld>
             <a:endParaRPr lang="en-SG"/>
           </a:p>
@@ -18352,7 +18360,7 @@
           <a:p>
             <a:fld id="{AB35F6B0-D468-4997-9CE3-CF2A1AE5E3F9}" type="datetimeFigureOut">
               <a:rPr lang="en-SG" smtClean="0"/>
-              <a:t>12/4/2023</a:t>
+              <a:t>20/4/2023</a:t>
             </a:fld>
             <a:endParaRPr lang="en-SG"/>
           </a:p>
@@ -18494,7 +18502,7 @@
           <a:p>
             <a:fld id="{AB35F6B0-D468-4997-9CE3-CF2A1AE5E3F9}" type="datetimeFigureOut">
               <a:rPr lang="en-SG" smtClean="0"/>
-              <a:t>12/4/2023</a:t>
+              <a:t>20/4/2023</a:t>
             </a:fld>
             <a:endParaRPr lang="en-SG"/>
           </a:p>
@@ -18607,7 +18615,7 @@
           <a:p>
             <a:fld id="{AB35F6B0-D468-4997-9CE3-CF2A1AE5E3F9}" type="datetimeFigureOut">
               <a:rPr lang="en-SG" smtClean="0"/>
-              <a:t>12/4/2023</a:t>
+              <a:t>20/4/2023</a:t>
             </a:fld>
             <a:endParaRPr lang="en-SG"/>
           </a:p>
@@ -18920,7 +18928,7 @@
           <a:p>
             <a:fld id="{AB35F6B0-D468-4997-9CE3-CF2A1AE5E3F9}" type="datetimeFigureOut">
               <a:rPr lang="en-SG" smtClean="0"/>
-              <a:t>12/4/2023</a:t>
+              <a:t>20/4/2023</a:t>
             </a:fld>
             <a:endParaRPr lang="en-SG"/>
           </a:p>
@@ -19209,7 +19217,7 @@
           <a:p>
             <a:fld id="{AB35F6B0-D468-4997-9CE3-CF2A1AE5E3F9}" type="datetimeFigureOut">
               <a:rPr lang="en-SG" smtClean="0"/>
-              <a:t>12/4/2023</a:t>
+              <a:t>20/4/2023</a:t>
             </a:fld>
             <a:endParaRPr lang="en-SG"/>
           </a:p>
@@ -19452,7 +19460,7 @@
           <a:p>
             <a:fld id="{AB35F6B0-D468-4997-9CE3-CF2A1AE5E3F9}" type="datetimeFigureOut">
               <a:rPr lang="en-SG" smtClean="0"/>
-              <a:t>12/4/2023</a:t>
+              <a:t>20/4/2023</a:t>
             </a:fld>
             <a:endParaRPr lang="en-SG"/>
           </a:p>
@@ -20811,53 +20819,53 @@
           </a:p>
           <a:p>
             <a:r>
-              <a:rPr lang="en-GB" sz="2400" dirty="0"/>
+              <a:rPr lang="en-GB" sz="2400" i="1" dirty="0"/>
               <a:t>I1.val = 26</a:t>
             </a:r>
           </a:p>
           <a:p>
             <a:r>
-              <a:rPr lang="en-SG" sz="2400" dirty="0"/>
+              <a:rPr lang="en-SG" sz="2400" i="1" dirty="0"/>
               <a:t>I2.val = 5</a:t>
             </a:r>
           </a:p>
           <a:p>
             <a:r>
-              <a:rPr lang="en-SG" sz="2400" dirty="0"/>
+              <a:rPr lang="en-SG" sz="2400" i="1" dirty="0"/>
               <a:t>T1.val = i2.val</a:t>
             </a:r>
           </a:p>
           <a:p>
             <a:r>
-              <a:rPr lang="en-SG" sz="2400" dirty="0"/>
+              <a:rPr lang="en-SG" sz="2400" i="1" dirty="0"/>
               <a:t>T2.val = T1.val*i1.val</a:t>
             </a:r>
           </a:p>
           <a:p>
             <a:r>
-              <a:rPr lang="en-SG" sz="2400" dirty="0"/>
+              <a:rPr lang="en-SG" sz="2400" i="1" dirty="0"/>
               <a:t>I3.val = 7</a:t>
             </a:r>
           </a:p>
           <a:p>
             <a:r>
-              <a:rPr lang="en-SG" sz="2400" dirty="0"/>
+              <a:rPr lang="en-SG" sz="2400" i="1" dirty="0"/>
               <a:t>T3.val = i3.val</a:t>
             </a:r>
           </a:p>
           <a:p>
             <a:r>
-              <a:rPr lang="en-SG" sz="2400" dirty="0"/>
+              <a:rPr lang="en-SG" sz="2400" i="1" dirty="0"/>
               <a:t>E1.val = T3.val</a:t>
             </a:r>
           </a:p>
           <a:p>
             <a:r>
-              <a:rPr lang="en-SG" sz="2400" dirty="0" err="1"/>
+              <a:rPr lang="en-SG" sz="2400" i="1" dirty="0" err="1"/>
               <a:t>E.val</a:t>
             </a:r>
             <a:r>
-              <a:rPr lang="en-SG" sz="2400" dirty="0"/>
+              <a:rPr lang="en-SG" sz="2400" i="1" dirty="0"/>
               <a:t> = T2.val + E1.val</a:t>
             </a:r>
           </a:p>

</xml_diff>